<commit_message>
maturitni otazka 2, fix chyby v prez 04
</commit_message>
<xml_diff>
--- a/Prezentace/3. ročník/PGM - 04 OOP rekapitulace.pptx
+++ b/Prezentace/3. ročník/PGM - 04 OOP rekapitulace.pptx
@@ -306,7 +306,7 @@
           <a:p>
             <a:fld id="{CCDA23A1-6BD0-48D8-A1FE-BC95074C88FA}" type="datetimeFigureOut">
               <a:rPr lang="cs-CZ" smtClean="0"/>
-              <a:t>13.10.2022</a:t>
+              <a:t>13.11.2022</a:t>
             </a:fld>
             <a:endParaRPr lang="cs-CZ"/>
           </a:p>
@@ -644,7 +644,7 @@
           <a:p>
             <a:fld id="{CCDA23A1-6BD0-48D8-A1FE-BC95074C88FA}" type="datetimeFigureOut">
               <a:rPr lang="cs-CZ" smtClean="0"/>
-              <a:t>13.10.2022</a:t>
+              <a:t>13.11.2022</a:t>
             </a:fld>
             <a:endParaRPr lang="cs-CZ"/>
           </a:p>
@@ -1045,7 +1045,7 @@
           <a:p>
             <a:fld id="{CCDA23A1-6BD0-48D8-A1FE-BC95074C88FA}" type="datetimeFigureOut">
               <a:rPr lang="cs-CZ" smtClean="0"/>
-              <a:t>13.10.2022</a:t>
+              <a:t>13.11.2022</a:t>
             </a:fld>
             <a:endParaRPr lang="cs-CZ"/>
           </a:p>
@@ -1380,7 +1380,7 @@
           <a:p>
             <a:fld id="{CCDA23A1-6BD0-48D8-A1FE-BC95074C88FA}" type="datetimeFigureOut">
               <a:rPr lang="cs-CZ" smtClean="0"/>
-              <a:t>13.10.2022</a:t>
+              <a:t>13.11.2022</a:t>
             </a:fld>
             <a:endParaRPr lang="cs-CZ"/>
           </a:p>
@@ -1700,7 +1700,7 @@
           <a:p>
             <a:fld id="{CCDA23A1-6BD0-48D8-A1FE-BC95074C88FA}" type="datetimeFigureOut">
               <a:rPr lang="cs-CZ" smtClean="0"/>
-              <a:t>13.10.2022</a:t>
+              <a:t>13.11.2022</a:t>
             </a:fld>
             <a:endParaRPr lang="cs-CZ"/>
           </a:p>
@@ -2096,7 +2096,7 @@
           <a:p>
             <a:fld id="{CCDA23A1-6BD0-48D8-A1FE-BC95074C88FA}" type="datetimeFigureOut">
               <a:rPr lang="cs-CZ" smtClean="0"/>
-              <a:t>13.10.2022</a:t>
+              <a:t>13.11.2022</a:t>
             </a:fld>
             <a:endParaRPr lang="cs-CZ"/>
           </a:p>
@@ -2353,7 +2353,7 @@
           <a:p>
             <a:fld id="{CCDA23A1-6BD0-48D8-A1FE-BC95074C88FA}" type="datetimeFigureOut">
               <a:rPr lang="cs-CZ" smtClean="0"/>
-              <a:t>13.10.2022</a:t>
+              <a:t>13.11.2022</a:t>
             </a:fld>
             <a:endParaRPr lang="cs-CZ"/>
           </a:p>
@@ -2615,7 +2615,7 @@
           <a:p>
             <a:fld id="{CCDA23A1-6BD0-48D8-A1FE-BC95074C88FA}" type="datetimeFigureOut">
               <a:rPr lang="cs-CZ" smtClean="0"/>
-              <a:t>13.10.2022</a:t>
+              <a:t>13.11.2022</a:t>
             </a:fld>
             <a:endParaRPr lang="cs-CZ"/>
           </a:p>
@@ -2877,7 +2877,7 @@
           <a:p>
             <a:fld id="{CCDA23A1-6BD0-48D8-A1FE-BC95074C88FA}" type="datetimeFigureOut">
               <a:rPr lang="cs-CZ" smtClean="0"/>
-              <a:t>13.10.2022</a:t>
+              <a:t>13.11.2022</a:t>
             </a:fld>
             <a:endParaRPr lang="cs-CZ"/>
           </a:p>
@@ -3206,7 +3206,7 @@
           <a:p>
             <a:fld id="{CCDA23A1-6BD0-48D8-A1FE-BC95074C88FA}" type="datetimeFigureOut">
               <a:rPr lang="cs-CZ" smtClean="0"/>
-              <a:t>13.10.2022</a:t>
+              <a:t>13.11.2022</a:t>
             </a:fld>
             <a:endParaRPr lang="cs-CZ"/>
           </a:p>
@@ -3529,7 +3529,7 @@
           <a:p>
             <a:fld id="{CCDA23A1-6BD0-48D8-A1FE-BC95074C88FA}" type="datetimeFigureOut">
               <a:rPr lang="cs-CZ" smtClean="0"/>
-              <a:t>13.10.2022</a:t>
+              <a:t>13.11.2022</a:t>
             </a:fld>
             <a:endParaRPr lang="cs-CZ"/>
           </a:p>
@@ -3986,7 +3986,7 @@
           <a:p>
             <a:fld id="{CCDA23A1-6BD0-48D8-A1FE-BC95074C88FA}" type="datetimeFigureOut">
               <a:rPr lang="cs-CZ" smtClean="0"/>
-              <a:t>13.10.2022</a:t>
+              <a:t>13.11.2022</a:t>
             </a:fld>
             <a:endParaRPr lang="cs-CZ"/>
           </a:p>
@@ -4191,7 +4191,7 @@
           <a:p>
             <a:fld id="{CCDA23A1-6BD0-48D8-A1FE-BC95074C88FA}" type="datetimeFigureOut">
               <a:rPr lang="cs-CZ" smtClean="0"/>
-              <a:t>13.10.2022</a:t>
+              <a:t>13.11.2022</a:t>
             </a:fld>
             <a:endParaRPr lang="cs-CZ"/>
           </a:p>
@@ -4368,7 +4368,7 @@
           <a:p>
             <a:fld id="{CCDA23A1-6BD0-48D8-A1FE-BC95074C88FA}" type="datetimeFigureOut">
               <a:rPr lang="cs-CZ" smtClean="0"/>
-              <a:t>13.10.2022</a:t>
+              <a:t>13.11.2022</a:t>
             </a:fld>
             <a:endParaRPr lang="cs-CZ"/>
           </a:p>
@@ -4701,7 +4701,7 @@
           <a:p>
             <a:fld id="{CCDA23A1-6BD0-48D8-A1FE-BC95074C88FA}" type="datetimeFigureOut">
               <a:rPr lang="cs-CZ" smtClean="0"/>
-              <a:t>13.10.2022</a:t>
+              <a:t>13.11.2022</a:t>
             </a:fld>
             <a:endParaRPr lang="cs-CZ"/>
           </a:p>
@@ -5046,7 +5046,7 @@
           <a:p>
             <a:fld id="{CCDA23A1-6BD0-48D8-A1FE-BC95074C88FA}" type="datetimeFigureOut">
               <a:rPr lang="cs-CZ" smtClean="0"/>
-              <a:t>13.10.2022</a:t>
+              <a:t>13.11.2022</a:t>
             </a:fld>
             <a:endParaRPr lang="cs-CZ"/>
           </a:p>
@@ -7163,7 +7163,7 @@
           <a:p>
             <a:fld id="{CCDA23A1-6BD0-48D8-A1FE-BC95074C88FA}" type="datetimeFigureOut">
               <a:rPr lang="cs-CZ" smtClean="0"/>
-              <a:t>13.10.2022</a:t>
+              <a:t>13.11.2022</a:t>
             </a:fld>
             <a:endParaRPr lang="cs-CZ"/>
           </a:p>
@@ -7715,7 +7715,7 @@
                 <a16:creationId xmlns:a16="http://schemas.microsoft.com/office/drawing/2014/main" id="{C0782607-67EF-47AC-96DF-A7DE2A282CCB}"/>
               </a:ext>
               <a:ext uri="{C183D7F6-B498-43B3-948B-1728B52AA6E4}">
-                <adec:decorative xmlns="" xmlns:adec="http://schemas.microsoft.com/office/drawing/2017/decorative" val="1"/>
+                <adec:decorative xmlns:adec="http://schemas.microsoft.com/office/drawing/2017/decorative" val="1"/>
               </a:ext>
             </a:extLst>
           </p:cNvPr>
@@ -7874,7 +7874,7 @@
                 <a16:creationId xmlns:a16="http://schemas.microsoft.com/office/drawing/2014/main" id="{65351FED-1024-4E4A-BE3B-371ABFCDF670}"/>
               </a:ext>
               <a:ext uri="{C183D7F6-B498-43B3-948B-1728B52AA6E4}">
-                <adec:decorative xmlns="" xmlns:adec="http://schemas.microsoft.com/office/drawing/2017/decorative" val="1"/>
+                <adec:decorative xmlns:adec="http://schemas.microsoft.com/office/drawing/2017/decorative" val="1"/>
               </a:ext>
             </a:extLst>
           </p:cNvPr>
@@ -7999,7 +7999,7 @@
                 <a16:creationId xmlns:a16="http://schemas.microsoft.com/office/drawing/2014/main" id="{6692CD4C-1BDD-4687-BFFE-33F1462F855E}"/>
               </a:ext>
               <a:ext uri="{C183D7F6-B498-43B3-948B-1728B52AA6E4}">
-                <adec:decorative xmlns="" xmlns:adec="http://schemas.microsoft.com/office/drawing/2017/decorative" val="1"/>
+                <adec:decorative xmlns:adec="http://schemas.microsoft.com/office/drawing/2017/decorative" val="1"/>
               </a:ext>
             </a:extLst>
           </p:cNvPr>
@@ -8269,18 +8269,13 @@
           <a:lstStyle/>
           <a:p>
             <a:r>
-              <a:rPr lang="cs-CZ" sz="1600" dirty="0" smtClean="0">
+              <a:rPr lang="cs-CZ" sz="1600" dirty="0">
                 <a:solidFill>
                   <a:srgbClr val="FEFFFF"/>
                 </a:solidFill>
               </a:rPr>
               <a:t>OOP rekapitulace</a:t>
             </a:r>
-            <a:endParaRPr lang="cs-CZ" sz="1600" dirty="0">
-              <a:solidFill>
-                <a:srgbClr val="FEFFFF"/>
-              </a:solidFill>
-            </a:endParaRPr>
           </a:p>
         </p:txBody>
       </p:sp>
@@ -8469,10 +8464,9 @@
           <a:lstStyle/>
           <a:p>
             <a:r>
-              <a:rPr lang="cs-CZ" dirty="0" smtClean="0"/>
+              <a:rPr lang="cs-CZ" dirty="0"/>
               <a:t>Objektové modelování v OOP</a:t>
             </a:r>
-            <a:endParaRPr lang="cs-CZ" dirty="0"/>
           </a:p>
         </p:txBody>
       </p:sp>
@@ -8492,53 +8486,53 @@
           <a:lstStyle/>
           <a:p>
             <a:r>
-              <a:rPr lang="cs-CZ" dirty="0" smtClean="0"/>
+              <a:rPr lang="cs-CZ" dirty="0"/>
               <a:t>= abstrakce reálných objektů pro potřebu implementace</a:t>
             </a:r>
           </a:p>
           <a:p>
             <a:r>
-              <a:rPr lang="cs-CZ" dirty="0" smtClean="0"/>
+              <a:rPr lang="cs-CZ" dirty="0"/>
               <a:t>Míra abstrakce se liší od použití</a:t>
             </a:r>
           </a:p>
           <a:p>
             <a:r>
-              <a:rPr lang="cs-CZ" dirty="0" smtClean="0"/>
+              <a:rPr lang="cs-CZ" dirty="0"/>
               <a:t>Princip modelování objektu:</a:t>
             </a:r>
           </a:p>
           <a:p>
             <a:pPr lvl="1"/>
             <a:r>
-              <a:rPr lang="cs-CZ" dirty="0" smtClean="0"/>
+              <a:rPr lang="cs-CZ" dirty="0"/>
               <a:t>Abstrakce</a:t>
             </a:r>
           </a:p>
           <a:p>
             <a:pPr lvl="1"/>
             <a:r>
-              <a:rPr lang="cs-CZ" dirty="0" smtClean="0"/>
+              <a:rPr lang="cs-CZ" dirty="0"/>
               <a:t>Formalizace</a:t>
             </a:r>
           </a:p>
           <a:p>
             <a:pPr lvl="1"/>
             <a:r>
-              <a:rPr lang="cs-CZ" dirty="0" smtClean="0"/>
+              <a:rPr lang="cs-CZ" dirty="0"/>
               <a:t>Jednoznačnost</a:t>
             </a:r>
           </a:p>
           <a:p>
             <a:pPr lvl="1"/>
             <a:r>
-              <a:rPr lang="cs-CZ" dirty="0" smtClean="0"/>
+              <a:rPr lang="cs-CZ" dirty="0"/>
               <a:t>Zamezení redundancí</a:t>
             </a:r>
           </a:p>
           <a:p>
             <a:pPr lvl="1"/>
-            <a:endParaRPr lang="cs-CZ" dirty="0" smtClean="0"/>
+            <a:endParaRPr lang="cs-CZ" dirty="0"/>
           </a:p>
         </p:txBody>
       </p:sp>
@@ -8552,13 +8546,6 @@
   <p:clrMapOvr>
     <a:masterClrMapping/>
   </p:clrMapOvr>
-  <p:timing>
-    <p:tnLst>
-      <p:par>
-        <p:cTn id="1" dur="indefinite" restart="never" nodeType="tmRoot"/>
-      </p:par>
-    </p:tnLst>
-  </p:timing>
 </p:sld>
 </file>
 
@@ -8595,10 +8582,9 @@
           <a:lstStyle/>
           <a:p>
             <a:r>
-              <a:rPr lang="cs-CZ" dirty="0" smtClean="0"/>
+              <a:rPr lang="cs-CZ" dirty="0"/>
               <a:t>Koncepce OOP - dědičnost</a:t>
             </a:r>
-            <a:endParaRPr lang="cs-CZ" dirty="0"/>
           </a:p>
         </p:txBody>
       </p:sp>
@@ -8618,40 +8604,40 @@
           <a:lstStyle/>
           <a:p>
             <a:r>
-              <a:rPr lang="cs-CZ" dirty="0" smtClean="0"/>
+              <a:rPr lang="cs-CZ" dirty="0"/>
               <a:t>Vytváření hierarchie objektů</a:t>
             </a:r>
           </a:p>
           <a:p>
             <a:r>
-              <a:rPr lang="cs-CZ" dirty="0" smtClean="0"/>
+              <a:rPr lang="cs-CZ" dirty="0"/>
               <a:t>Odvozená třída dědí atributy a metody třídy nadřazené</a:t>
             </a:r>
           </a:p>
           <a:p>
             <a:r>
-              <a:rPr lang="cs-CZ" dirty="0" smtClean="0"/>
+              <a:rPr lang="cs-CZ" dirty="0"/>
               <a:t>V C# je nejvyšší třídou, ze kterého je každá třída odvozena, třída </a:t>
             </a:r>
             <a:r>
-              <a:rPr lang="cs-CZ" b="1" dirty="0" err="1" smtClean="0"/>
-              <a:t>SuperClass</a:t>
-            </a:r>
-            <a:endParaRPr lang="cs-CZ" b="1" dirty="0" smtClean="0"/>
-          </a:p>
-          <a:p>
-            <a:r>
-              <a:rPr lang="cs-CZ" dirty="0" smtClean="0"/>
+              <a:rPr lang="cs-CZ" b="1"/>
+              <a:t>Object</a:t>
+            </a:r>
+            <a:endParaRPr lang="cs-CZ" b="1" dirty="0"/>
+          </a:p>
+          <a:p>
+            <a:r>
+              <a:rPr lang="cs-CZ" dirty="0"/>
               <a:t>Princip dědičnosti je využit i v databázových modelech</a:t>
             </a:r>
           </a:p>
           <a:p>
             <a:r>
-              <a:rPr lang="cs-CZ" dirty="0" smtClean="0"/>
+              <a:rPr lang="cs-CZ" dirty="0"/>
               <a:t>Na předchůdce třídy přistupujeme pomocí klíčového slova </a:t>
             </a:r>
             <a:r>
-              <a:rPr lang="cs-CZ" b="1" dirty="0" smtClean="0"/>
+              <a:rPr lang="cs-CZ" b="1" dirty="0"/>
               <a:t>base</a:t>
             </a:r>
           </a:p>
@@ -8748,13 +8734,6 @@
   <p:clrMapOvr>
     <a:masterClrMapping/>
   </p:clrMapOvr>
-  <p:timing>
-    <p:tnLst>
-      <p:par>
-        <p:cTn id="1" dur="indefinite" restart="never" nodeType="tmRoot"/>
-      </p:par>
-    </p:tnLst>
-  </p:timing>
 </p:sld>
 </file>
 
@@ -8791,11 +8770,11 @@
           <a:lstStyle/>
           <a:p>
             <a:r>
-              <a:rPr lang="cs-CZ" dirty="0" smtClean="0"/>
+              <a:rPr lang="cs-CZ" dirty="0"/>
               <a:t>Koncepce OOP </a:t>
             </a:r>
             <a:r>
-              <a:rPr lang="cs-CZ" smtClean="0"/>
+              <a:rPr lang="cs-CZ"/>
               <a:t>- zapouzdření</a:t>
             </a:r>
             <a:endParaRPr lang="cs-CZ" dirty="0"/>
@@ -8818,53 +8797,53 @@
           <a:lstStyle/>
           <a:p>
             <a:r>
-              <a:rPr lang="cs-CZ" dirty="0" smtClean="0"/>
+              <a:rPr lang="cs-CZ" dirty="0"/>
               <a:t>Vytvářená třída může mít libovolné množství členů</a:t>
             </a:r>
           </a:p>
           <a:p>
             <a:r>
-              <a:rPr lang="cs-CZ" dirty="0" smtClean="0"/>
+              <a:rPr lang="cs-CZ" dirty="0"/>
               <a:t>Při správném použití konceptu zapouzdření jsou data skryta uvnitř třídy</a:t>
             </a:r>
           </a:p>
           <a:p>
             <a:r>
-              <a:rPr lang="cs-CZ" dirty="0" smtClean="0"/>
+              <a:rPr lang="cs-CZ" dirty="0"/>
               <a:t>K hodnotám přistupujeme skrze metody</a:t>
             </a:r>
           </a:p>
           <a:p>
             <a:r>
-              <a:rPr lang="cs-CZ" dirty="0" smtClean="0"/>
+              <a:rPr lang="cs-CZ" dirty="0"/>
               <a:t>Viditelnosti:</a:t>
             </a:r>
           </a:p>
           <a:p>
             <a:pPr lvl="1"/>
             <a:r>
-              <a:rPr lang="cs-CZ" dirty="0" smtClean="0"/>
+              <a:rPr lang="cs-CZ" dirty="0"/>
               <a:t>Public</a:t>
             </a:r>
           </a:p>
           <a:p>
             <a:pPr lvl="1"/>
             <a:r>
-              <a:rPr lang="cs-CZ" dirty="0" err="1" smtClean="0"/>
+              <a:rPr lang="cs-CZ" dirty="0" err="1"/>
               <a:t>Private</a:t>
             </a:r>
             <a:r>
-              <a:rPr lang="cs-CZ" dirty="0" smtClean="0"/>
+              <a:rPr lang="cs-CZ" dirty="0"/>
               <a:t> – používáme pro skrytí před vnějším přístupem</a:t>
             </a:r>
           </a:p>
           <a:p>
             <a:pPr lvl="1"/>
             <a:r>
-              <a:rPr lang="cs-CZ" dirty="0" err="1" smtClean="0"/>
+              <a:rPr lang="cs-CZ" dirty="0" err="1"/>
               <a:t>Protected</a:t>
             </a:r>
-            <a:endParaRPr lang="cs-CZ" dirty="0" smtClean="0"/>
+            <a:endParaRPr lang="cs-CZ" dirty="0"/>
           </a:p>
           <a:p>
             <a:pPr marL="0" indent="0">
@@ -8884,13 +8863,6 @@
   <p:clrMapOvr>
     <a:masterClrMapping/>
   </p:clrMapOvr>
-  <p:timing>
-    <p:tnLst>
-      <p:par>
-        <p:cTn id="1" dur="indefinite" restart="never" nodeType="tmRoot"/>
-      </p:par>
-    </p:tnLst>
-  </p:timing>
 </p:sld>
 </file>
 
@@ -8927,10 +8899,9 @@
           <a:lstStyle/>
           <a:p>
             <a:r>
-              <a:rPr lang="cs-CZ" dirty="0" smtClean="0"/>
+              <a:rPr lang="cs-CZ" dirty="0"/>
               <a:t>Koncepce OOP - polymorfismus</a:t>
             </a:r>
-            <a:endParaRPr lang="cs-CZ" dirty="0"/>
           </a:p>
         </p:txBody>
       </p:sp>
@@ -8950,105 +8921,100 @@
           <a:lstStyle/>
           <a:p>
             <a:r>
-              <a:rPr lang="cs-CZ" dirty="0" smtClean="0"/>
+              <a:rPr lang="cs-CZ" dirty="0"/>
               <a:t>Koncept umožňující, aby akce uskutečněné nad objektem měly stejný/obdobný výsledek, ale realizace se liší</a:t>
             </a:r>
           </a:p>
           <a:p>
             <a:r>
-              <a:rPr lang="cs-CZ" dirty="0" smtClean="0"/>
+              <a:rPr lang="cs-CZ" dirty="0"/>
               <a:t>Realizace (implementace) je odlišná právě od typu objektu</a:t>
             </a:r>
           </a:p>
           <a:p>
             <a:r>
-              <a:rPr lang="cs-CZ" b="1" dirty="0" smtClean="0"/>
+              <a:rPr lang="cs-CZ" b="1" dirty="0"/>
               <a:t>Virtuální</a:t>
             </a:r>
             <a:r>
-              <a:rPr lang="cs-CZ" dirty="0" smtClean="0"/>
-              <a:t> </a:t>
-            </a:r>
-            <a:r>
-              <a:rPr lang="cs-CZ" dirty="0" smtClean="0"/>
-              <a:t>metody</a:t>
+              <a:rPr lang="cs-CZ" dirty="0"/>
+              <a:t> metody</a:t>
             </a:r>
           </a:p>
           <a:p>
             <a:pPr lvl="1"/>
             <a:r>
-              <a:rPr lang="cs-CZ" dirty="0" smtClean="0"/>
+              <a:rPr lang="cs-CZ" dirty="0"/>
               <a:t>Označení metod, kterým umožníme k </a:t>
             </a:r>
             <a:r>
-              <a:rPr lang="cs-CZ" dirty="0" err="1" smtClean="0"/>
+              <a:rPr lang="cs-CZ" dirty="0" err="1"/>
               <a:t>reimplementaci</a:t>
             </a:r>
             <a:r>
-              <a:rPr lang="cs-CZ" dirty="0" smtClean="0"/>
+              <a:rPr lang="cs-CZ" dirty="0"/>
               <a:t> v třídě odvozené</a:t>
             </a:r>
           </a:p>
           <a:p>
             <a:pPr lvl="1"/>
             <a:r>
-              <a:rPr lang="cs-CZ" dirty="0" smtClean="0"/>
+              <a:rPr lang="cs-CZ" dirty="0"/>
               <a:t>V případě, že třída tuto metodu </a:t>
             </a:r>
             <a:r>
-              <a:rPr lang="cs-CZ" dirty="0" err="1" smtClean="0"/>
+              <a:rPr lang="cs-CZ" dirty="0" err="1"/>
               <a:t>reimplementovanu</a:t>
             </a:r>
             <a:r>
-              <a:rPr lang="cs-CZ" dirty="0" smtClean="0"/>
+              <a:rPr lang="cs-CZ" dirty="0"/>
               <a:t> nemá, použije se řešení z třídy nadřazené</a:t>
             </a:r>
           </a:p>
           <a:p>
             <a:pPr lvl="1"/>
             <a:r>
-              <a:rPr lang="cs-CZ" dirty="0" smtClean="0"/>
+              <a:rPr lang="cs-CZ" dirty="0"/>
               <a:t>Přepsanou virtuální funkci označujeme klíčovým slovem </a:t>
             </a:r>
             <a:r>
-              <a:rPr lang="cs-CZ" b="1" dirty="0" err="1" smtClean="0"/>
+              <a:rPr lang="cs-CZ" b="1" dirty="0" err="1"/>
               <a:t>override</a:t>
             </a:r>
-            <a:endParaRPr lang="cs-CZ" b="1" dirty="0" smtClean="0"/>
+            <a:endParaRPr lang="cs-CZ" b="1" dirty="0"/>
           </a:p>
           <a:p>
             <a:pPr lvl="1"/>
             <a:r>
-              <a:rPr lang="cs-CZ" dirty="0" smtClean="0"/>
+              <a:rPr lang="cs-CZ" dirty="0"/>
               <a:t>V těchto funkcích můžeme pomocí </a:t>
             </a:r>
             <a:r>
-              <a:rPr lang="cs-CZ" b="1" dirty="0" smtClean="0"/>
+              <a:rPr lang="cs-CZ" b="1" dirty="0"/>
               <a:t>base</a:t>
             </a:r>
             <a:r>
-              <a:rPr lang="cs-CZ" dirty="0" smtClean="0"/>
+              <a:rPr lang="cs-CZ" dirty="0"/>
               <a:t> volat implementaci předešlou</a:t>
             </a:r>
           </a:p>
           <a:p>
             <a:r>
-              <a:rPr lang="cs-CZ" dirty="0" err="1" smtClean="0"/>
+              <a:rPr lang="cs-CZ" dirty="0" err="1"/>
               <a:t>Override</a:t>
             </a:r>
             <a:r>
-              <a:rPr lang="cs-CZ" dirty="0" smtClean="0"/>
+              <a:rPr lang="cs-CZ" dirty="0"/>
               <a:t> a </a:t>
             </a:r>
             <a:r>
-              <a:rPr lang="cs-CZ" dirty="0" err="1" smtClean="0"/>
+              <a:rPr lang="cs-CZ" dirty="0" err="1"/>
               <a:t>virtual</a:t>
             </a:r>
             <a:r>
-              <a:rPr lang="cs-CZ" dirty="0" smtClean="0"/>
+              <a:rPr lang="cs-CZ" dirty="0"/>
               <a:t> nelze použít u privátních funkcí třídy</a:t>
             </a:r>
-            <a:endParaRPr lang="cs-CZ" dirty="0"/>
           </a:p>
         </p:txBody>
       </p:sp>
@@ -9062,13 +9028,6 @@
   <p:clrMapOvr>
     <a:masterClrMapping/>
   </p:clrMapOvr>
-  <p:timing>
-    <p:tnLst>
-      <p:par>
-        <p:cTn id="1" dur="indefinite" restart="never" nodeType="tmRoot"/>
-      </p:par>
-    </p:tnLst>
-  </p:timing>
 </p:sld>
 </file>
 
@@ -9105,10 +9064,9 @@
           <a:lstStyle/>
           <a:p>
             <a:r>
-              <a:rPr lang="cs-CZ" dirty="0" smtClean="0"/>
+              <a:rPr lang="cs-CZ" dirty="0"/>
               <a:t>Abstraktní metody a třídy</a:t>
             </a:r>
-            <a:endParaRPr lang="cs-CZ" dirty="0"/>
           </a:p>
         </p:txBody>
       </p:sp>
@@ -9128,45 +9086,44 @@
           <a:lstStyle/>
           <a:p>
             <a:r>
-              <a:rPr lang="cs-CZ" dirty="0" smtClean="0"/>
+              <a:rPr lang="cs-CZ" dirty="0"/>
               <a:t>Klíčové slovo </a:t>
             </a:r>
             <a:r>
-              <a:rPr lang="cs-CZ" b="1" dirty="0" err="1" smtClean="0"/>
+              <a:rPr lang="cs-CZ" b="1" dirty="0" err="1"/>
               <a:t>abstract</a:t>
             </a:r>
-            <a:endParaRPr lang="cs-CZ" b="1" dirty="0" smtClean="0"/>
-          </a:p>
-          <a:p>
-            <a:r>
-              <a:rPr lang="cs-CZ" dirty="0" smtClean="0"/>
+            <a:endParaRPr lang="cs-CZ" b="1" dirty="0"/>
+          </a:p>
+          <a:p>
+            <a:r>
+              <a:rPr lang="cs-CZ" dirty="0"/>
               <a:t>Abstraktní metody neobsahují implementaci, ale pouze hlavičku volání dané funkce</a:t>
             </a:r>
           </a:p>
           <a:p>
             <a:r>
-              <a:rPr lang="cs-CZ" dirty="0" smtClean="0"/>
+              <a:rPr lang="cs-CZ" dirty="0"/>
               <a:t>Abstraktní metody jsou automaticky virtuální</a:t>
             </a:r>
           </a:p>
           <a:p>
             <a:r>
-              <a:rPr lang="cs-CZ" dirty="0" smtClean="0"/>
+              <a:rPr lang="cs-CZ" dirty="0"/>
               <a:t>Třída obsahující abstraktní metodu = abstraktní třída</a:t>
             </a:r>
           </a:p>
           <a:p>
             <a:r>
-              <a:rPr lang="cs-CZ" dirty="0" smtClean="0"/>
+              <a:rPr lang="cs-CZ" dirty="0"/>
               <a:t>Z abstraktní třídy nelze vytvořit novou instanci (objekt)</a:t>
             </a:r>
           </a:p>
           <a:p>
             <a:r>
-              <a:rPr lang="cs-CZ" dirty="0" smtClean="0"/>
+              <a:rPr lang="cs-CZ" dirty="0"/>
               <a:t>Jako abstraktní mohou být uvedeny i události a vlastnosti třídy</a:t>
             </a:r>
-            <a:endParaRPr lang="cs-CZ" dirty="0"/>
           </a:p>
         </p:txBody>
       </p:sp>
@@ -9180,13 +9137,6 @@
   <p:clrMapOvr>
     <a:masterClrMapping/>
   </p:clrMapOvr>
-  <p:timing>
-    <p:tnLst>
-      <p:par>
-        <p:cTn id="1" dur="indefinite" restart="never" nodeType="tmRoot"/>
-      </p:par>
-    </p:tnLst>
-  </p:timing>
 </p:sld>
 </file>
 
@@ -9223,10 +9173,9 @@
           <a:lstStyle/>
           <a:p>
             <a:r>
-              <a:rPr lang="cs-CZ" dirty="0" smtClean="0"/>
+              <a:rPr lang="cs-CZ" dirty="0"/>
               <a:t>Rozhraní</a:t>
             </a:r>
-            <a:endParaRPr lang="cs-CZ" dirty="0"/>
           </a:p>
         </p:txBody>
       </p:sp>
@@ -9246,54 +9195,49 @@
           <a:lstStyle/>
           <a:p>
             <a:r>
-              <a:rPr lang="cs-CZ" dirty="0" smtClean="0"/>
+              <a:rPr lang="cs-CZ" dirty="0"/>
               <a:t>Rozhraní (interface) definuje popis funkčností třídy, která je z daného rozhraní odvozena</a:t>
             </a:r>
           </a:p>
           <a:p>
             <a:r>
-              <a:rPr lang="cs-CZ" dirty="0" smtClean="0"/>
+              <a:rPr lang="cs-CZ" dirty="0"/>
               <a:t>Obsahuje seznam členů a položek, které se odvozená třída (i struktura) zavazuje implementovat</a:t>
             </a:r>
           </a:p>
           <a:p>
             <a:r>
-              <a:rPr lang="cs-CZ" dirty="0" smtClean="0"/>
+              <a:rPr lang="cs-CZ" dirty="0"/>
               <a:t>Jedno rozhraní může dědit od jednoho či více rozhraní</a:t>
             </a:r>
           </a:p>
           <a:p>
             <a:r>
-              <a:rPr lang="cs-CZ" dirty="0" smtClean="0"/>
+              <a:rPr lang="cs-CZ" dirty="0"/>
               <a:t>Pozor, třída může dědit pouze z jedné třídy!</a:t>
             </a:r>
           </a:p>
           <a:p>
             <a:r>
-              <a:rPr lang="cs-CZ" dirty="0" smtClean="0"/>
+              <a:rPr lang="cs-CZ" dirty="0"/>
               <a:t>Jedna třída může implementovat jedno či více rozhraní</a:t>
             </a:r>
           </a:p>
           <a:p>
             <a:r>
-              <a:rPr lang="cs-CZ" dirty="0" smtClean="0"/>
+              <a:rPr lang="cs-CZ" dirty="0"/>
               <a:t>Všechny členy jsou automaticky </a:t>
             </a:r>
             <a:r>
-              <a:rPr lang="cs-CZ" b="1" dirty="0" smtClean="0"/>
+              <a:rPr lang="cs-CZ" b="1" dirty="0"/>
               <a:t>public</a:t>
             </a:r>
           </a:p>
           <a:p>
             <a:r>
-              <a:rPr lang="cs-CZ" dirty="0" smtClean="0"/>
-              <a:t>Z rozhraní rovněž nelze vytvořit novou </a:t>
-            </a:r>
-            <a:r>
-              <a:rPr lang="cs-CZ" dirty="0" smtClean="0"/>
-              <a:t>instanci</a:t>
-            </a:r>
-            <a:endParaRPr lang="cs-CZ" dirty="0"/>
+              <a:rPr lang="cs-CZ" dirty="0"/>
+              <a:t>Z rozhraní rovněž nelze vytvořit novou instanci</a:t>
+            </a:r>
           </a:p>
         </p:txBody>
       </p:sp>
@@ -9307,13 +9251,6 @@
   <p:clrMapOvr>
     <a:masterClrMapping/>
   </p:clrMapOvr>
-  <p:timing>
-    <p:tnLst>
-      <p:par>
-        <p:cTn id="1" dur="indefinite" restart="never" nodeType="tmRoot"/>
-      </p:par>
-    </p:tnLst>
-  </p:timing>
 </p:sld>
 </file>
 

</xml_diff>